<commit_message>
Many updates on Sep30, including a new main figure
</commit_message>
<xml_diff>
--- a/MSI_tumor_assignment_demo.pptx
+++ b/MSI_tumor_assignment_demo.pptx
@@ -129,12 +129,12 @@
   <pc:docChgLst>
     <pc:chgData name="Mo Liu" userId="e9c7212a1ac174da" providerId="LiveId" clId="{5FDBA922-9E05-42C8-B28E-DC4BEAF29E97}"/>
     <pc:docChg chg="custSel addSld modSld">
-      <pc:chgData name="Mo Liu" userId="e9c7212a1ac174da" providerId="LiveId" clId="{5FDBA922-9E05-42C8-B28E-DC4BEAF29E97}" dt="2024-09-23T09:20:21.972" v="516" actId="20577"/>
+      <pc:chgData name="Mo Liu" userId="e9c7212a1ac174da" providerId="LiveId" clId="{5FDBA922-9E05-42C8-B28E-DC4BEAF29E97}" dt="2024-09-27T00:25:14.098" v="519" actId="1076"/>
       <pc:docMkLst>
         <pc:docMk/>
       </pc:docMkLst>
       <pc:sldChg chg="modSp mod">
-        <pc:chgData name="Mo Liu" userId="e9c7212a1ac174da" providerId="LiveId" clId="{5FDBA922-9E05-42C8-B28E-DC4BEAF29E97}" dt="2024-09-23T09:20:21.972" v="516" actId="20577"/>
+        <pc:chgData name="Mo Liu" userId="e9c7212a1ac174da" providerId="LiveId" clId="{5FDBA922-9E05-42C8-B28E-DC4BEAF29E97}" dt="2024-09-27T00:25:14.098" v="519" actId="1076"/>
         <pc:sldMkLst>
           <pc:docMk/>
           <pc:sldMk cId="1694002835" sldId="257"/>
@@ -156,7 +156,7 @@
           </ac:spMkLst>
         </pc:spChg>
         <pc:picChg chg="mod">
-          <ac:chgData name="Mo Liu" userId="e9c7212a1ac174da" providerId="LiveId" clId="{5FDBA922-9E05-42C8-B28E-DC4BEAF29E97}" dt="2024-09-23T09:16:23.460" v="74" actId="1076"/>
+          <ac:chgData name="Mo Liu" userId="e9c7212a1ac174da" providerId="LiveId" clId="{5FDBA922-9E05-42C8-B28E-DC4BEAF29E97}" dt="2024-09-27T00:25:14.098" v="519" actId="1076"/>
           <ac:picMkLst>
             <pc:docMk/>
             <pc:sldMk cId="1694002835" sldId="257"/>
@@ -443,7 +443,7 @@
           <a:p>
             <a:fld id="{E0C2E75B-A520-4543-B491-EBEB2C00BD6A}" type="datetimeFigureOut">
               <a:rPr lang="zh-CN" altLang="en-US" smtClean="0"/>
-              <a:t>2024/9/23</a:t>
+              <a:t>2024/9/27</a:t>
             </a:fld>
             <a:endParaRPr lang="zh-CN" altLang="en-US"/>
           </a:p>
@@ -643,7 +643,7 @@
           <a:p>
             <a:fld id="{E0C2E75B-A520-4543-B491-EBEB2C00BD6A}" type="datetimeFigureOut">
               <a:rPr lang="zh-CN" altLang="en-US" smtClean="0"/>
-              <a:t>2024/9/23</a:t>
+              <a:t>2024/9/27</a:t>
             </a:fld>
             <a:endParaRPr lang="zh-CN" altLang="en-US"/>
           </a:p>
@@ -853,7 +853,7 @@
           <a:p>
             <a:fld id="{E0C2E75B-A520-4543-B491-EBEB2C00BD6A}" type="datetimeFigureOut">
               <a:rPr lang="zh-CN" altLang="en-US" smtClean="0"/>
-              <a:t>2024/9/23</a:t>
+              <a:t>2024/9/27</a:t>
             </a:fld>
             <a:endParaRPr lang="zh-CN" altLang="en-US"/>
           </a:p>
@@ -1053,7 +1053,7 @@
           <a:p>
             <a:fld id="{E0C2E75B-A520-4543-B491-EBEB2C00BD6A}" type="datetimeFigureOut">
               <a:rPr lang="zh-CN" altLang="en-US" smtClean="0"/>
-              <a:t>2024/9/23</a:t>
+              <a:t>2024/9/27</a:t>
             </a:fld>
             <a:endParaRPr lang="zh-CN" altLang="en-US"/>
           </a:p>
@@ -1329,7 +1329,7 @@
           <a:p>
             <a:fld id="{E0C2E75B-A520-4543-B491-EBEB2C00BD6A}" type="datetimeFigureOut">
               <a:rPr lang="zh-CN" altLang="en-US" smtClean="0"/>
-              <a:t>2024/9/23</a:t>
+              <a:t>2024/9/27</a:t>
             </a:fld>
             <a:endParaRPr lang="zh-CN" altLang="en-US"/>
           </a:p>
@@ -1597,7 +1597,7 @@
           <a:p>
             <a:fld id="{E0C2E75B-A520-4543-B491-EBEB2C00BD6A}" type="datetimeFigureOut">
               <a:rPr lang="zh-CN" altLang="en-US" smtClean="0"/>
-              <a:t>2024/9/23</a:t>
+              <a:t>2024/9/27</a:t>
             </a:fld>
             <a:endParaRPr lang="zh-CN" altLang="en-US"/>
           </a:p>
@@ -2012,7 +2012,7 @@
           <a:p>
             <a:fld id="{E0C2E75B-A520-4543-B491-EBEB2C00BD6A}" type="datetimeFigureOut">
               <a:rPr lang="zh-CN" altLang="en-US" smtClean="0"/>
-              <a:t>2024/9/23</a:t>
+              <a:t>2024/9/27</a:t>
             </a:fld>
             <a:endParaRPr lang="zh-CN" altLang="en-US"/>
           </a:p>
@@ -2154,7 +2154,7 @@
           <a:p>
             <a:fld id="{E0C2E75B-A520-4543-B491-EBEB2C00BD6A}" type="datetimeFigureOut">
               <a:rPr lang="zh-CN" altLang="en-US" smtClean="0"/>
-              <a:t>2024/9/23</a:t>
+              <a:t>2024/9/27</a:t>
             </a:fld>
             <a:endParaRPr lang="zh-CN" altLang="en-US"/>
           </a:p>
@@ -2267,7 +2267,7 @@
           <a:p>
             <a:fld id="{E0C2E75B-A520-4543-B491-EBEB2C00BD6A}" type="datetimeFigureOut">
               <a:rPr lang="zh-CN" altLang="en-US" smtClean="0"/>
-              <a:t>2024/9/23</a:t>
+              <a:t>2024/9/27</a:t>
             </a:fld>
             <a:endParaRPr lang="zh-CN" altLang="en-US"/>
           </a:p>
@@ -2580,7 +2580,7 @@
           <a:p>
             <a:fld id="{E0C2E75B-A520-4543-B491-EBEB2C00BD6A}" type="datetimeFigureOut">
               <a:rPr lang="zh-CN" altLang="en-US" smtClean="0"/>
-              <a:t>2024/9/23</a:t>
+              <a:t>2024/9/27</a:t>
             </a:fld>
             <a:endParaRPr lang="zh-CN" altLang="en-US"/>
           </a:p>
@@ -2869,7 +2869,7 @@
           <a:p>
             <a:fld id="{E0C2E75B-A520-4543-B491-EBEB2C00BD6A}" type="datetimeFigureOut">
               <a:rPr lang="zh-CN" altLang="en-US" smtClean="0"/>
-              <a:t>2024/9/23</a:t>
+              <a:t>2024/9/27</a:t>
             </a:fld>
             <a:endParaRPr lang="zh-CN" altLang="en-US"/>
           </a:p>
@@ -3112,7 +3112,7 @@
           <a:p>
             <a:fld id="{E0C2E75B-A520-4543-B491-EBEB2C00BD6A}" type="datetimeFigureOut">
               <a:rPr lang="zh-CN" altLang="en-US" smtClean="0"/>
-              <a:t>2024/9/23</a:t>
+              <a:t>2024/9/27</a:t>
             </a:fld>
             <a:endParaRPr lang="zh-CN" altLang="en-US"/>
           </a:p>
@@ -3720,8 +3720,8 @@
         </p:blipFill>
         <p:spPr>
           <a:xfrm>
-            <a:off x="5769088" y="1176868"/>
-            <a:ext cx="5584712" cy="4994318"/>
+            <a:off x="5394960" y="0"/>
+            <a:ext cx="8016240" cy="7168794"/>
           </a:xfrm>
           <a:prstGeom prst="rect">
             <a:avLst/>

</xml_diff>